<commit_message>
Added installation instruction for m2e connector for builder-helper-maven-plugin
</commit_message>
<xml_diff>
--- a/docs/goovy-tdd-installation.pptx
+++ b/docs/goovy-tdd-installation.pptx
@@ -5,7 +5,7 @@
     <p:sldMasterId id="2147483710" r:id="rId1"/>
   </p:sldMasterIdLst>
   <p:notesMasterIdLst>
-    <p:notesMasterId r:id="rId10"/>
+    <p:notesMasterId r:id="rId11"/>
   </p:notesMasterIdLst>
   <p:sldIdLst>
     <p:sldId id="256" r:id="rId2"/>
@@ -16,6 +16,7 @@
     <p:sldId id="262" r:id="rId7"/>
     <p:sldId id="258" r:id="rId8"/>
     <p:sldId id="259" r:id="rId9"/>
+    <p:sldId id="265" r:id="rId10"/>
   </p:sldIdLst>
   <p:sldSz cx="6858000" cy="9144000" type="screen4x3"/>
   <p:notesSz cx="7315200" cy="9601200"/>
@@ -5842,14 +5843,31 @@
         </p:nvSpPr>
         <p:spPr/>
         <p:txBody>
-          <a:bodyPr/>
+          <a:bodyPr>
+            <a:normAutofit fontScale="90000"/>
+          </a:bodyPr>
           <a:lstStyle/>
           <a:p>
             <a:r>
               <a:rPr lang="en-US" dirty="0" smtClean="0"/>
-              <a:t>Eclipse Plugin Installation	</a:t>
-            </a:r>
-            <a:endParaRPr lang="en-US" dirty="0"/>
+              <a:t>Eclipse Plugin </a:t>
+            </a:r>
+            <a:r>
+              <a:rPr lang="en-US" dirty="0" smtClean="0"/>
+              <a:t>Installation</a:t>
+            </a:r>
+            <a:br>
+              <a:rPr lang="en-US" dirty="0" smtClean="0"/>
+            </a:br>
+            <a:r>
+              <a:rPr lang="en-US" sz="2700" dirty="0" smtClean="0"/>
+              <a:t>Groovy-Eclipse</a:t>
+            </a:r>
+            <a:r>
+              <a:rPr lang="en-US" sz="2700" dirty="0" smtClean="0"/>
+              <a:t>	</a:t>
+            </a:r>
+            <a:endParaRPr lang="en-US" sz="2700" dirty="0"/>
           </a:p>
         </p:txBody>
       </p:sp>
@@ -5924,8 +5942,13 @@
             </a:pPr>
             <a:r>
               <a:rPr lang="en-US" dirty="0" smtClean="0"/>
-              <a:t>Select the feature “Groovy-Eclipse”</a:t>
-            </a:r>
+              <a:t>Select the feature “Groovy-</a:t>
+            </a:r>
+            <a:r>
+              <a:rPr lang="en-US" dirty="0" smtClean="0"/>
+              <a:t>Eclipse Feature”</a:t>
+            </a:r>
+            <a:endParaRPr lang="en-US" dirty="0" smtClean="0"/>
           </a:p>
         </p:txBody>
       </p:sp>
@@ -6158,6 +6181,385 @@
       </p:par>
     </p:tnLst>
   </p:timing>
+</p:sld>
+</file>
+
+<file path=ppt/slides/slide9.xml><?xml version="1.0" encoding="utf-8"?>
+<p:sld xmlns:a="http://schemas.openxmlformats.org/drawingml/2006/main" xmlns:r="http://schemas.openxmlformats.org/officeDocument/2006/relationships" xmlns:p="http://schemas.openxmlformats.org/presentationml/2006/main">
+  <p:cSld>
+    <p:spTree>
+      <p:nvGrpSpPr>
+        <p:cNvPr id="1" name=""/>
+        <p:cNvGrpSpPr/>
+        <p:nvPr/>
+      </p:nvGrpSpPr>
+      <p:grpSpPr>
+        <a:xfrm>
+          <a:off x="0" y="0"/>
+          <a:ext cx="0" cy="0"/>
+          <a:chOff x="0" y="0"/>
+          <a:chExt cx="0" cy="0"/>
+        </a:xfrm>
+      </p:grpSpPr>
+      <p:sp>
+        <p:nvSpPr>
+          <p:cNvPr id="2" name="Title 1"/>
+          <p:cNvSpPr>
+            <a:spLocks noGrp="1"/>
+          </p:cNvSpPr>
+          <p:nvPr>
+            <p:ph type="ctrTitle"/>
+          </p:nvPr>
+        </p:nvSpPr>
+        <p:spPr>
+          <a:xfrm>
+            <a:off x="514350" y="761229"/>
+            <a:ext cx="5829300" cy="1290491"/>
+          </a:xfrm>
+        </p:spPr>
+        <p:txBody>
+          <a:bodyPr>
+            <a:normAutofit fontScale="90000"/>
+          </a:bodyPr>
+          <a:lstStyle/>
+          <a:p>
+            <a:r>
+              <a:rPr lang="en-US" dirty="0" smtClean="0"/>
+              <a:t/>
+            </a:r>
+            <a:br>
+              <a:rPr lang="en-US" dirty="0" smtClean="0"/>
+            </a:br>
+            <a:r>
+              <a:rPr lang="en-US" dirty="0"/>
+              <a:t/>
+            </a:r>
+            <a:br>
+              <a:rPr lang="en-US" dirty="0"/>
+            </a:br>
+            <a:r>
+              <a:rPr lang="en-US" dirty="0"/>
+              <a:t>Eclipse Plugin </a:t>
+            </a:r>
+            <a:r>
+              <a:rPr lang="en-US" dirty="0" smtClean="0"/>
+              <a:t>Installation</a:t>
+            </a:r>
+            <a:br>
+              <a:rPr lang="en-US" dirty="0" smtClean="0"/>
+            </a:br>
+            <a:r>
+              <a:rPr lang="en-US" sz="2700" dirty="0" smtClean="0"/>
+              <a:t>m2e connector for build</a:t>
+            </a:r>
+            <a:r>
+              <a:rPr lang="en-US" sz="2700" dirty="0"/>
+              <a:t>-helper-maven-plugin</a:t>
+            </a:r>
+          </a:p>
+        </p:txBody>
+      </p:sp>
+      <p:sp>
+        <p:nvSpPr>
+          <p:cNvPr id="3" name="Text Placeholder 2"/>
+          <p:cNvSpPr>
+            <a:spLocks noGrp="1"/>
+          </p:cNvSpPr>
+          <p:nvPr>
+            <p:ph type="body" sz="quarter" idx="13"/>
+          </p:nvPr>
+        </p:nvSpPr>
+        <p:spPr>
+          <a:xfrm>
+            <a:off x="514352" y="2219739"/>
+            <a:ext cx="5790977" cy="5088565"/>
+          </a:xfrm>
+        </p:spPr>
+        <p:txBody>
+          <a:bodyPr/>
+          <a:lstStyle/>
+          <a:p>
+            <a:pPr marL="0" indent="0">
+              <a:buNone/>
+            </a:pPr>
+            <a:r>
+              <a:rPr lang="en-US" dirty="0"/>
+              <a:t>Use the Eclipse Update manager to install the Groovy Eclipse plugin. </a:t>
+            </a:r>
+          </a:p>
+          <a:p>
+            <a:pPr marL="400050">
+              <a:buFont typeface="Lucida Grande"/>
+              <a:buChar char="-"/>
+            </a:pPr>
+            <a:r>
+              <a:rPr lang="en-US" dirty="0"/>
+              <a:t>To install a new functionality, select Help → Install New Software....</a:t>
+            </a:r>
+          </a:p>
+          <a:p>
+            <a:pPr marL="400050">
+              <a:buFont typeface="Lucida Grande"/>
+              <a:buChar char="-"/>
+            </a:pPr>
+            <a:r>
+              <a:rPr lang="en-US" dirty="0"/>
+              <a:t>Point your Eclipse update manager to the update site appropriate for your Eclipse version</a:t>
+            </a:r>
+          </a:p>
+          <a:p>
+            <a:pPr marL="57150" indent="0">
+              <a:buNone/>
+            </a:pPr>
+            <a:endParaRPr lang="en-US" dirty="0"/>
+          </a:p>
+          <a:p>
+            <a:pPr marL="57150" indent="0">
+              <a:buNone/>
+            </a:pPr>
+            <a:endParaRPr lang="en-US" dirty="0" smtClean="0"/>
+          </a:p>
+          <a:p>
+            <a:pPr marL="57150" indent="0">
+              <a:buNone/>
+            </a:pPr>
+            <a:endParaRPr lang="en-US" dirty="0"/>
+          </a:p>
+          <a:p>
+            <a:pPr marL="0" indent="0">
+              <a:buNone/>
+            </a:pPr>
+            <a:endParaRPr lang="en-US" dirty="0"/>
+          </a:p>
+        </p:txBody>
+      </p:sp>
+      <p:sp>
+        <p:nvSpPr>
+          <p:cNvPr id="4" name="Text Placeholder 2"/>
+          <p:cNvSpPr txBox="1">
+            <a:spLocks/>
+          </p:cNvSpPr>
+          <p:nvPr/>
+        </p:nvSpPr>
+        <p:spPr>
+          <a:xfrm>
+            <a:off x="980728" y="5220072"/>
+            <a:ext cx="4536504" cy="1008112"/>
+          </a:xfrm>
+          <a:prstGeom prst="roundRect">
+            <a:avLst/>
+          </a:prstGeom>
+          <a:solidFill>
+            <a:schemeClr val="accent1">
+              <a:lumMod val="20000"/>
+              <a:lumOff val="80000"/>
+            </a:schemeClr>
+          </a:solidFill>
+          <a:ln w="12700" cap="rnd" cmpd="sng">
+            <a:solidFill>
+              <a:schemeClr val="tx1"/>
+            </a:solidFill>
+            <a:round/>
+          </a:ln>
+          <a:effectLst>
+            <a:outerShdw blurRad="50800" dist="38100" dir="2700000" algn="tl" rotWithShape="0">
+              <a:schemeClr val="accent1">
+                <a:lumMod val="75000"/>
+                <a:alpha val="43000"/>
+              </a:schemeClr>
+            </a:outerShdw>
+          </a:effectLst>
+        </p:spPr>
+        <p:txBody>
+          <a:bodyPr anchor="ctr"/>
+          <a:lstStyle>
+            <a:lvl1pPr marL="342900" indent="-342900" algn="l" defTabSz="457200" rtl="0" eaLnBrk="1" fontAlgn="base" hangingPunct="1">
+              <a:spcBef>
+                <a:spcPct val="20000"/>
+              </a:spcBef>
+              <a:spcAft>
+                <a:spcPct val="0"/>
+              </a:spcAft>
+              <a:buFont typeface="Arial" charset="0"/>
+              <a:buChar char="•"/>
+              <a:defRPr sz="2400" kern="1200">
+                <a:solidFill>
+                  <a:schemeClr val="tx1"/>
+                </a:solidFill>
+                <a:latin typeface="+mn-lt"/>
+                <a:ea typeface="ＭＳ Ｐゴシック" pitchFamily="-111" charset="-128"/>
+                <a:cs typeface="ＭＳ Ｐゴシック" pitchFamily="-111" charset="-128"/>
+              </a:defRPr>
+            </a:lvl1pPr>
+            <a:lvl2pPr marL="742950" indent="-285750" algn="l" defTabSz="457200" rtl="0" eaLnBrk="1" fontAlgn="base" hangingPunct="1">
+              <a:spcBef>
+                <a:spcPct val="20000"/>
+              </a:spcBef>
+              <a:spcAft>
+                <a:spcPct val="0"/>
+              </a:spcAft>
+              <a:buFont typeface="Arial" charset="0"/>
+              <a:buChar char="–"/>
+              <a:defRPr sz="2200" kern="1200">
+                <a:solidFill>
+                  <a:schemeClr val="tx1"/>
+                </a:solidFill>
+                <a:latin typeface="+mn-lt"/>
+                <a:ea typeface="ＭＳ Ｐゴシック" pitchFamily="-111" charset="-128"/>
+                <a:cs typeface="ＭＳ Ｐゴシック"/>
+              </a:defRPr>
+            </a:lvl2pPr>
+            <a:lvl3pPr marL="1143000" indent="-228600" algn="l" defTabSz="457200" rtl="0" eaLnBrk="1" fontAlgn="base" hangingPunct="1">
+              <a:spcBef>
+                <a:spcPct val="20000"/>
+              </a:spcBef>
+              <a:spcAft>
+                <a:spcPct val="0"/>
+              </a:spcAft>
+              <a:buFont typeface="Calibri" pitchFamily="34" charset="0"/>
+              <a:buChar char="»"/>
+              <a:defRPr sz="2000" kern="1200">
+                <a:solidFill>
+                  <a:schemeClr val="tx1"/>
+                </a:solidFill>
+                <a:latin typeface="+mn-lt"/>
+                <a:ea typeface="ＭＳ Ｐゴシック" pitchFamily="-111" charset="-128"/>
+                <a:cs typeface="ＭＳ Ｐゴシック"/>
+              </a:defRPr>
+            </a:lvl3pPr>
+            <a:lvl4pPr marL="1600200" indent="-228600" algn="l" defTabSz="457200" rtl="0" eaLnBrk="1" fontAlgn="base" hangingPunct="1">
+              <a:spcBef>
+                <a:spcPct val="20000"/>
+              </a:spcBef>
+              <a:spcAft>
+                <a:spcPct val="0"/>
+              </a:spcAft>
+              <a:buFont typeface="Arial" charset="0"/>
+              <a:buChar char="–"/>
+              <a:defRPr sz="1800" kern="1200">
+                <a:solidFill>
+                  <a:schemeClr val="tx1">
+                    <a:lumMod val="75000"/>
+                    <a:lumOff val="25000"/>
+                  </a:schemeClr>
+                </a:solidFill>
+                <a:latin typeface="+mn-lt"/>
+                <a:ea typeface="ＭＳ Ｐゴシック" pitchFamily="-111" charset="-128"/>
+                <a:cs typeface="ＭＳ Ｐゴシック"/>
+              </a:defRPr>
+            </a:lvl4pPr>
+            <a:lvl5pPr marL="2057400" indent="-228600" algn="l" defTabSz="457200" rtl="0" eaLnBrk="1" fontAlgn="base" hangingPunct="1">
+              <a:spcBef>
+                <a:spcPct val="20000"/>
+              </a:spcBef>
+              <a:spcAft>
+                <a:spcPct val="0"/>
+              </a:spcAft>
+              <a:buFont typeface="Arial" charset="0"/>
+              <a:buChar char="»"/>
+              <a:defRPr sz="1800" kern="1200">
+                <a:solidFill>
+                  <a:schemeClr val="tx1">
+                    <a:lumMod val="75000"/>
+                    <a:lumOff val="25000"/>
+                  </a:schemeClr>
+                </a:solidFill>
+                <a:latin typeface="+mn-lt"/>
+                <a:ea typeface="ＭＳ Ｐゴシック" pitchFamily="-111" charset="-128"/>
+                <a:cs typeface="ＭＳ Ｐゴシック"/>
+              </a:defRPr>
+            </a:lvl5pPr>
+            <a:lvl6pPr marL="2514600" indent="-228600" algn="l" defTabSz="457200" rtl="0" eaLnBrk="1" latinLnBrk="0" hangingPunct="1">
+              <a:spcBef>
+                <a:spcPct val="20000"/>
+              </a:spcBef>
+              <a:buFont typeface="Arial"/>
+              <a:buChar char="•"/>
+              <a:defRPr sz="2000" kern="1200">
+                <a:solidFill>
+                  <a:schemeClr val="tx1"/>
+                </a:solidFill>
+                <a:latin typeface="+mn-lt"/>
+                <a:ea typeface="+mn-ea"/>
+                <a:cs typeface="+mn-cs"/>
+              </a:defRPr>
+            </a:lvl6pPr>
+            <a:lvl7pPr marL="2971800" indent="-228600" algn="l" defTabSz="457200" rtl="0" eaLnBrk="1" latinLnBrk="0" hangingPunct="1">
+              <a:spcBef>
+                <a:spcPct val="20000"/>
+              </a:spcBef>
+              <a:buFont typeface="Arial"/>
+              <a:buChar char="•"/>
+              <a:defRPr sz="2000" kern="1200">
+                <a:solidFill>
+                  <a:schemeClr val="tx1"/>
+                </a:solidFill>
+                <a:latin typeface="+mn-lt"/>
+                <a:ea typeface="+mn-ea"/>
+                <a:cs typeface="+mn-cs"/>
+              </a:defRPr>
+            </a:lvl7pPr>
+            <a:lvl8pPr marL="3429000" indent="-228600" algn="l" defTabSz="457200" rtl="0" eaLnBrk="1" latinLnBrk="0" hangingPunct="1">
+              <a:spcBef>
+                <a:spcPct val="20000"/>
+              </a:spcBef>
+              <a:buFont typeface="Arial"/>
+              <a:buChar char="•"/>
+              <a:defRPr sz="2000" kern="1200">
+                <a:solidFill>
+                  <a:schemeClr val="tx1"/>
+                </a:solidFill>
+                <a:latin typeface="+mn-lt"/>
+                <a:ea typeface="+mn-ea"/>
+                <a:cs typeface="+mn-cs"/>
+              </a:defRPr>
+            </a:lvl8pPr>
+            <a:lvl9pPr marL="3886200" indent="-228600" algn="l" defTabSz="457200" rtl="0" eaLnBrk="1" latinLnBrk="0" hangingPunct="1">
+              <a:spcBef>
+                <a:spcPct val="20000"/>
+              </a:spcBef>
+              <a:buFont typeface="Arial"/>
+              <a:buChar char="•"/>
+              <a:defRPr sz="2000" kern="1200">
+                <a:solidFill>
+                  <a:schemeClr val="tx1"/>
+                </a:solidFill>
+                <a:latin typeface="+mn-lt"/>
+                <a:ea typeface="+mn-ea"/>
+                <a:cs typeface="+mn-cs"/>
+              </a:defRPr>
+            </a:lvl9pPr>
+          </a:lstStyle>
+          <a:p>
+            <a:pPr marL="0" indent="0">
+              <a:buNone/>
+            </a:pPr>
+            <a:r>
+              <a:rPr lang="en-US" sz="1800" dirty="0">
+                <a:hlinkClick r:id="rId2"/>
+              </a:rPr>
+              <a:t>https://repository.sonatype.org/content/repositories/forge-sites/m2e-extras/0.15.0/N/0.15.0.201206251206</a:t>
+            </a:r>
+            <a:r>
+              <a:rPr lang="en-US" sz="1800" dirty="0" smtClean="0">
+                <a:hlinkClick r:id="rId2"/>
+              </a:rPr>
+              <a:t>/</a:t>
+            </a:r>
+            <a:endParaRPr lang="en-US" sz="1800" dirty="0"/>
+          </a:p>
+        </p:txBody>
+      </p:sp>
+    </p:spTree>
+    <p:extLst>
+      <p:ext uri="{BB962C8B-B14F-4D97-AF65-F5344CB8AC3E}">
+        <p14:creationId xmlns:p14="http://schemas.microsoft.com/office/powerpoint/2010/main" val="1556050955"/>
+      </p:ext>
+    </p:extLst>
+  </p:cSld>
+  <p:clrMapOvr>
+    <a:masterClrMapping/>
+  </p:clrMapOvr>
 </p:sld>
 </file>
 

</xml_diff>

<commit_message>
Cosmetic changes to installation PPT
</commit_message>
<xml_diff>
--- a/docs/goovy-tdd-installation.pptx
+++ b/docs/goovy-tdd-installation.pptx
@@ -4460,7 +4460,7 @@
         </p:nvSpPr>
         <p:spPr/>
         <p:txBody>
-          <a:bodyPr/>
+          <a:bodyPr anchor="t"/>
           <a:lstStyle/>
           <a:p>
             <a:r>
@@ -4578,7 +4578,7 @@
         </p:nvSpPr>
         <p:spPr/>
         <p:txBody>
-          <a:bodyPr>
+          <a:bodyPr anchor="t">
             <a:normAutofit fontScale="90000"/>
           </a:bodyPr>
           <a:lstStyle/>
@@ -4713,7 +4713,7 @@
         </p:nvSpPr>
         <p:spPr/>
         <p:txBody>
-          <a:bodyPr>
+          <a:bodyPr anchor="t">
             <a:normAutofit fontScale="90000"/>
           </a:bodyPr>
           <a:lstStyle/>
@@ -5083,7 +5083,7 @@
         </p:nvSpPr>
         <p:spPr/>
         <p:txBody>
-          <a:bodyPr>
+          <a:bodyPr anchor="t">
             <a:normAutofit fontScale="90000"/>
           </a:bodyPr>
           <a:lstStyle/>
@@ -5246,7 +5246,7 @@
         </p:nvSpPr>
         <p:spPr/>
         <p:txBody>
-          <a:bodyPr>
+          <a:bodyPr anchor="t">
             <a:normAutofit fontScale="90000"/>
           </a:bodyPr>
           <a:lstStyle/>
@@ -5449,7 +5449,7 @@
         </p:nvSpPr>
         <p:spPr/>
         <p:txBody>
-          <a:bodyPr/>
+          <a:bodyPr anchor="t"/>
           <a:lstStyle/>
           <a:p>
             <a:r>
@@ -5843,7 +5843,7 @@
         </p:nvSpPr>
         <p:spPr/>
         <p:txBody>
-          <a:bodyPr>
+          <a:bodyPr anchor="t">
             <a:normAutofit fontScale="90000"/>
           </a:bodyPr>
           <a:lstStyle/>
@@ -6218,28 +6218,18 @@
           </a:xfrm>
         </p:spPr>
         <p:txBody>
-          <a:bodyPr>
+          <a:bodyPr anchor="t">
             <a:normAutofit fontScale="90000"/>
           </a:bodyPr>
           <a:lstStyle/>
           <a:p>
             <a:r>
               <a:rPr lang="en-US" dirty="0" smtClean="0"/>
-              <a:t/>
-            </a:r>
-            <a:br>
-              <a:rPr lang="en-US" dirty="0" smtClean="0"/>
-            </a:br>
+              <a:t>Eclipse </a:t>
+            </a:r>
             <a:r>
               <a:rPr lang="en-US" dirty="0"/>
-              <a:t/>
-            </a:r>
-            <a:br>
-              <a:rPr lang="en-US" dirty="0"/>
-            </a:br>
-            <a:r>
-              <a:rPr lang="en-US" dirty="0"/>
-              <a:t>Eclipse Plugin </a:t>
+              <a:t>Plugin </a:t>
             </a:r>
             <a:r>
               <a:rPr lang="en-US" dirty="0" smtClean="0"/>

</xml_diff>